<commit_message>
Upgrade to PIO 3.8 beta5
</commit_message>
<xml_diff>
--- a/test-data/slideshow/shapes.pptx
+++ b/test-data/slideshow/shapes.pptx
@@ -10,6 +10,7 @@
     <p:sldId id="257" r:id="rId4"/>
     <p:sldId id="259" r:id="rId5"/>
     <p:sldId id="260" r:id="rId6"/>
+    <p:sldId id="261" r:id="rId7"/>
   </p:sldIdLst>
   <p:sldSz cx="9144000" cy="6858000" type="screen4x3"/>
   <p:notesSz cx="6858000" cy="9144000"/>
@@ -293,7 +294,7 @@
             <a:fld id="{1D8BD707-D9CF-40AE-B4C6-C98DA3205C09}" type="datetimeFigureOut">
               <a:rPr lang="en-US" smtClean="0"/>
               <a:pPr/>
-              <a:t>8/17/2011</a:t>
+              <a:t>10/17/2011</a:t>
             </a:fld>
             <a:endParaRPr lang="en-US"/>
           </a:p>
@@ -460,7 +461,7 @@
             <a:fld id="{1D8BD707-D9CF-40AE-B4C6-C98DA3205C09}" type="datetimeFigureOut">
               <a:rPr lang="en-US" smtClean="0"/>
               <a:pPr/>
-              <a:t>8/17/2011</a:t>
+              <a:t>10/17/2011</a:t>
             </a:fld>
             <a:endParaRPr lang="en-US"/>
           </a:p>
@@ -637,7 +638,7 @@
             <a:fld id="{1D8BD707-D9CF-40AE-B4C6-C98DA3205C09}" type="datetimeFigureOut">
               <a:rPr lang="en-US" smtClean="0"/>
               <a:pPr/>
-              <a:t>8/17/2011</a:t>
+              <a:t>10/17/2011</a:t>
             </a:fld>
             <a:endParaRPr lang="en-US"/>
           </a:p>
@@ -804,7 +805,7 @@
             <a:fld id="{1D8BD707-D9CF-40AE-B4C6-C98DA3205C09}" type="datetimeFigureOut">
               <a:rPr lang="en-US" smtClean="0"/>
               <a:pPr/>
-              <a:t>8/17/2011</a:t>
+              <a:t>10/17/2011</a:t>
             </a:fld>
             <a:endParaRPr lang="en-US"/>
           </a:p>
@@ -1047,7 +1048,7 @@
             <a:fld id="{1D8BD707-D9CF-40AE-B4C6-C98DA3205C09}" type="datetimeFigureOut">
               <a:rPr lang="en-US" smtClean="0"/>
               <a:pPr/>
-              <a:t>8/17/2011</a:t>
+              <a:t>10/17/2011</a:t>
             </a:fld>
             <a:endParaRPr lang="en-US"/>
           </a:p>
@@ -1332,7 +1333,7 @@
             <a:fld id="{1D8BD707-D9CF-40AE-B4C6-C98DA3205C09}" type="datetimeFigureOut">
               <a:rPr lang="en-US" smtClean="0"/>
               <a:pPr/>
-              <a:t>8/17/2011</a:t>
+              <a:t>10/17/2011</a:t>
             </a:fld>
             <a:endParaRPr lang="en-US"/>
           </a:p>
@@ -1751,7 +1752,7 @@
             <a:fld id="{1D8BD707-D9CF-40AE-B4C6-C98DA3205C09}" type="datetimeFigureOut">
               <a:rPr lang="en-US" smtClean="0"/>
               <a:pPr/>
-              <a:t>8/17/2011</a:t>
+              <a:t>10/17/2011</a:t>
             </a:fld>
             <a:endParaRPr lang="en-US"/>
           </a:p>
@@ -1866,7 +1867,7 @@
             <a:fld id="{1D8BD707-D9CF-40AE-B4C6-C98DA3205C09}" type="datetimeFigureOut">
               <a:rPr lang="en-US" smtClean="0"/>
               <a:pPr/>
-              <a:t>8/17/2011</a:t>
+              <a:t>10/17/2011</a:t>
             </a:fld>
             <a:endParaRPr lang="en-US"/>
           </a:p>
@@ -1958,7 +1959,7 @@
             <a:fld id="{1D8BD707-D9CF-40AE-B4C6-C98DA3205C09}" type="datetimeFigureOut">
               <a:rPr lang="en-US" smtClean="0"/>
               <a:pPr/>
-              <a:t>8/17/2011</a:t>
+              <a:t>10/17/2011</a:t>
             </a:fld>
             <a:endParaRPr lang="en-US"/>
           </a:p>
@@ -2232,7 +2233,7 @@
             <a:fld id="{1D8BD707-D9CF-40AE-B4C6-C98DA3205C09}" type="datetimeFigureOut">
               <a:rPr lang="en-US" smtClean="0"/>
               <a:pPr/>
-              <a:t>8/17/2011</a:t>
+              <a:t>10/17/2011</a:t>
             </a:fld>
             <a:endParaRPr lang="en-US"/>
           </a:p>
@@ -2482,7 +2483,7 @@
             <a:fld id="{1D8BD707-D9CF-40AE-B4C6-C98DA3205C09}" type="datetimeFigureOut">
               <a:rPr lang="en-US" smtClean="0"/>
               <a:pPr/>
-              <a:t>8/17/2011</a:t>
+              <a:t>10/17/2011</a:t>
             </a:fld>
             <a:endParaRPr lang="en-US"/>
           </a:p>
@@ -2692,7 +2693,7 @@
             <a:fld id="{1D8BD707-D9CF-40AE-B4C6-C98DA3205C09}" type="datetimeFigureOut">
               <a:rPr lang="en-US" smtClean="0"/>
               <a:pPr/>
-              <a:t>8/17/2011</a:t>
+              <a:t>10/17/2011</a:t>
             </a:fld>
             <a:endParaRPr lang="en-US"/>
           </a:p>
@@ -4752,6 +4753,304 @@
 </p:sld>
 </file>
 
+<file path=ppt/slides/slide6.xml><?xml version="1.0" encoding="utf-8"?>
+<p:sld xmlns:a="http://schemas.openxmlformats.org/drawingml/2006/main" xmlns:r="http://schemas.openxmlformats.org/officeDocument/2006/relationships" xmlns:p="http://schemas.openxmlformats.org/presentationml/2006/main">
+  <p:cSld>
+    <p:spTree>
+      <p:nvGrpSpPr>
+        <p:cNvPr id="1" name=""/>
+        <p:cNvGrpSpPr/>
+        <p:nvPr/>
+      </p:nvGrpSpPr>
+      <p:grpSpPr>
+        <a:xfrm>
+          <a:off x="0" y="0"/>
+          <a:ext cx="0" cy="0"/>
+          <a:chOff x="0" y="0"/>
+          <a:chExt cx="0" cy="0"/>
+        </a:xfrm>
+      </p:grpSpPr>
+      <p:sp>
+        <p:nvSpPr>
+          <p:cNvPr id="2" name="Rectangle 1"/>
+          <p:cNvSpPr/>
+          <p:nvPr/>
+        </p:nvSpPr>
+        <p:spPr>
+          <a:xfrm>
+            <a:off x="838200" y="914400"/>
+            <a:ext cx="914400" cy="914400"/>
+          </a:xfrm>
+          <a:prstGeom prst="rect">
+            <a:avLst/>
+          </a:prstGeom>
+        </p:spPr>
+        <p:style>
+          <a:lnRef idx="2">
+            <a:schemeClr val="accent1">
+              <a:shade val="50000"/>
+            </a:schemeClr>
+          </a:lnRef>
+          <a:fillRef idx="1">
+            <a:schemeClr val="accent1"/>
+          </a:fillRef>
+          <a:effectRef idx="0">
+            <a:schemeClr val="accent1"/>
+          </a:effectRef>
+          <a:fontRef idx="minor">
+            <a:schemeClr val="lt1"/>
+          </a:fontRef>
+        </p:style>
+        <p:txBody>
+          <a:bodyPr rtlCol="0" anchor="ctr"/>
+          <a:lstStyle/>
+          <a:p>
+            <a:pPr algn="ctr"/>
+            <a:endParaRPr lang="en-US"/>
+          </a:p>
+        </p:txBody>
+      </p:sp>
+      <p:sp>
+        <p:nvSpPr>
+          <p:cNvPr id="9" name="Rectangle 8"/>
+          <p:cNvSpPr/>
+          <p:nvPr/>
+        </p:nvSpPr>
+        <p:spPr>
+          <a:xfrm>
+            <a:off x="2209800" y="914400"/>
+            <a:ext cx="914400" cy="914400"/>
+          </a:xfrm>
+          <a:prstGeom prst="rect">
+            <a:avLst/>
+          </a:prstGeom>
+          <a:solidFill>
+            <a:schemeClr val="accent1">
+              <a:lumMod val="20000"/>
+              <a:lumOff val="80000"/>
+            </a:schemeClr>
+          </a:solidFill>
+        </p:spPr>
+        <p:style>
+          <a:lnRef idx="2">
+            <a:schemeClr val="accent1">
+              <a:shade val="50000"/>
+            </a:schemeClr>
+          </a:lnRef>
+          <a:fillRef idx="1">
+            <a:schemeClr val="accent1"/>
+          </a:fillRef>
+          <a:effectRef idx="0">
+            <a:schemeClr val="accent1"/>
+          </a:effectRef>
+          <a:fontRef idx="minor">
+            <a:schemeClr val="lt1"/>
+          </a:fontRef>
+        </p:style>
+        <p:txBody>
+          <a:bodyPr rtlCol="0" anchor="ctr"/>
+          <a:lstStyle/>
+          <a:p>
+            <a:pPr algn="ctr"/>
+            <a:endParaRPr lang="en-US"/>
+          </a:p>
+        </p:txBody>
+      </p:sp>
+      <p:sp>
+        <p:nvSpPr>
+          <p:cNvPr id="10" name="Rectangle 9"/>
+          <p:cNvSpPr/>
+          <p:nvPr/>
+        </p:nvSpPr>
+        <p:spPr>
+          <a:xfrm>
+            <a:off x="3429000" y="914400"/>
+            <a:ext cx="914400" cy="914400"/>
+          </a:xfrm>
+          <a:prstGeom prst="rect">
+            <a:avLst/>
+          </a:prstGeom>
+          <a:solidFill>
+            <a:schemeClr val="accent1">
+              <a:lumMod val="40000"/>
+              <a:lumOff val="60000"/>
+            </a:schemeClr>
+          </a:solidFill>
+        </p:spPr>
+        <p:style>
+          <a:lnRef idx="2">
+            <a:schemeClr val="accent1">
+              <a:shade val="50000"/>
+            </a:schemeClr>
+          </a:lnRef>
+          <a:fillRef idx="1">
+            <a:schemeClr val="accent1"/>
+          </a:fillRef>
+          <a:effectRef idx="0">
+            <a:schemeClr val="accent1"/>
+          </a:effectRef>
+          <a:fontRef idx="minor">
+            <a:schemeClr val="lt1"/>
+          </a:fontRef>
+        </p:style>
+        <p:txBody>
+          <a:bodyPr rtlCol="0" anchor="ctr"/>
+          <a:lstStyle/>
+          <a:p>
+            <a:pPr algn="ctr"/>
+            <a:endParaRPr lang="en-US"/>
+          </a:p>
+        </p:txBody>
+      </p:sp>
+      <p:sp>
+        <p:nvSpPr>
+          <p:cNvPr id="11" name="Rectangle 10"/>
+          <p:cNvSpPr/>
+          <p:nvPr/>
+        </p:nvSpPr>
+        <p:spPr>
+          <a:xfrm>
+            <a:off x="4648200" y="914400"/>
+            <a:ext cx="914400" cy="914400"/>
+          </a:xfrm>
+          <a:prstGeom prst="rect">
+            <a:avLst/>
+          </a:prstGeom>
+          <a:solidFill>
+            <a:schemeClr val="accent1">
+              <a:lumMod val="60000"/>
+              <a:lumOff val="40000"/>
+            </a:schemeClr>
+          </a:solidFill>
+        </p:spPr>
+        <p:style>
+          <a:lnRef idx="2">
+            <a:schemeClr val="accent1">
+              <a:shade val="50000"/>
+            </a:schemeClr>
+          </a:lnRef>
+          <a:fillRef idx="1">
+            <a:schemeClr val="accent1"/>
+          </a:fillRef>
+          <a:effectRef idx="0">
+            <a:schemeClr val="accent1"/>
+          </a:effectRef>
+          <a:fontRef idx="minor">
+            <a:schemeClr val="lt1"/>
+          </a:fontRef>
+        </p:style>
+        <p:txBody>
+          <a:bodyPr rtlCol="0" anchor="ctr"/>
+          <a:lstStyle/>
+          <a:p>
+            <a:pPr algn="ctr"/>
+            <a:endParaRPr lang="en-US"/>
+          </a:p>
+        </p:txBody>
+      </p:sp>
+      <p:sp>
+        <p:nvSpPr>
+          <p:cNvPr id="12" name="Rectangle 11"/>
+          <p:cNvSpPr/>
+          <p:nvPr/>
+        </p:nvSpPr>
+        <p:spPr>
+          <a:xfrm>
+            <a:off x="5943600" y="914400"/>
+            <a:ext cx="914400" cy="914400"/>
+          </a:xfrm>
+          <a:prstGeom prst="rect">
+            <a:avLst/>
+          </a:prstGeom>
+          <a:solidFill>
+            <a:schemeClr val="accent1">
+              <a:lumMod val="75000"/>
+            </a:schemeClr>
+          </a:solidFill>
+        </p:spPr>
+        <p:style>
+          <a:lnRef idx="2">
+            <a:schemeClr val="accent1">
+              <a:shade val="50000"/>
+            </a:schemeClr>
+          </a:lnRef>
+          <a:fillRef idx="1">
+            <a:schemeClr val="accent1"/>
+          </a:fillRef>
+          <a:effectRef idx="0">
+            <a:schemeClr val="accent1"/>
+          </a:effectRef>
+          <a:fontRef idx="minor">
+            <a:schemeClr val="lt1"/>
+          </a:fontRef>
+        </p:style>
+        <p:txBody>
+          <a:bodyPr rtlCol="0" anchor="ctr"/>
+          <a:lstStyle/>
+          <a:p>
+            <a:pPr algn="ctr"/>
+            <a:endParaRPr lang="en-US"/>
+          </a:p>
+        </p:txBody>
+      </p:sp>
+      <p:sp>
+        <p:nvSpPr>
+          <p:cNvPr id="13" name="Rectangle 12"/>
+          <p:cNvSpPr/>
+          <p:nvPr/>
+        </p:nvSpPr>
+        <p:spPr>
+          <a:xfrm>
+            <a:off x="7543800" y="914400"/>
+            <a:ext cx="914400" cy="914400"/>
+          </a:xfrm>
+          <a:prstGeom prst="rect">
+            <a:avLst/>
+          </a:prstGeom>
+          <a:solidFill>
+            <a:schemeClr val="accent1">
+              <a:lumMod val="50000"/>
+            </a:schemeClr>
+          </a:solidFill>
+        </p:spPr>
+        <p:style>
+          <a:lnRef idx="2">
+            <a:schemeClr val="accent1">
+              <a:shade val="50000"/>
+            </a:schemeClr>
+          </a:lnRef>
+          <a:fillRef idx="1">
+            <a:schemeClr val="accent1"/>
+          </a:fillRef>
+          <a:effectRef idx="0">
+            <a:schemeClr val="accent1"/>
+          </a:effectRef>
+          <a:fontRef idx="minor">
+            <a:schemeClr val="lt1"/>
+          </a:fontRef>
+        </p:style>
+        <p:txBody>
+          <a:bodyPr rtlCol="0" anchor="ctr"/>
+          <a:lstStyle/>
+          <a:p>
+            <a:pPr algn="ctr"/>
+            <a:endParaRPr lang="en-US"/>
+          </a:p>
+        </p:txBody>
+      </p:sp>
+    </p:spTree>
+    <p:extLst>
+      <p:ext uri="{BB962C8B-B14F-4D97-AF65-F5344CB8AC3E}">
+        <p14:creationId xmlns:p14="http://schemas.microsoft.com/office/powerpoint/2010/main" val="2509082867"/>
+      </p:ext>
+    </p:extLst>
+  </p:cSld>
+  <p:clrMapOvr>
+    <a:masterClrMapping/>
+  </p:clrMapOvr>
+</p:sld>
+</file>
+
 <file path=ppt/theme/theme1.xml><?xml version="1.0" encoding="utf-8"?>
 <a:theme xmlns:a="http://schemas.openxmlformats.org/drawingml/2006/main" name="Office Theme">
   <a:themeElements>

</xml_diff>

<commit_message>
zk-poi upgrade to PIO 3.8 beta5: the rest
</commit_message>
<xml_diff>
--- a/test-data/slideshow/shapes.pptx
+++ b/test-data/slideshow/shapes.pptx
@@ -10,6 +10,7 @@
     <p:sldId id="257" r:id="rId4"/>
     <p:sldId id="259" r:id="rId5"/>
     <p:sldId id="260" r:id="rId6"/>
+    <p:sldId id="261" r:id="rId7"/>
   </p:sldIdLst>
   <p:sldSz cx="9144000" cy="6858000" type="screen4x3"/>
   <p:notesSz cx="6858000" cy="9144000"/>
@@ -293,7 +294,7 @@
             <a:fld id="{1D8BD707-D9CF-40AE-B4C6-C98DA3205C09}" type="datetimeFigureOut">
               <a:rPr lang="en-US" smtClean="0"/>
               <a:pPr/>
-              <a:t>8/17/2011</a:t>
+              <a:t>10/17/2011</a:t>
             </a:fld>
             <a:endParaRPr lang="en-US"/>
           </a:p>
@@ -460,7 +461,7 @@
             <a:fld id="{1D8BD707-D9CF-40AE-B4C6-C98DA3205C09}" type="datetimeFigureOut">
               <a:rPr lang="en-US" smtClean="0"/>
               <a:pPr/>
-              <a:t>8/17/2011</a:t>
+              <a:t>10/17/2011</a:t>
             </a:fld>
             <a:endParaRPr lang="en-US"/>
           </a:p>
@@ -637,7 +638,7 @@
             <a:fld id="{1D8BD707-D9CF-40AE-B4C6-C98DA3205C09}" type="datetimeFigureOut">
               <a:rPr lang="en-US" smtClean="0"/>
               <a:pPr/>
-              <a:t>8/17/2011</a:t>
+              <a:t>10/17/2011</a:t>
             </a:fld>
             <a:endParaRPr lang="en-US"/>
           </a:p>
@@ -804,7 +805,7 @@
             <a:fld id="{1D8BD707-D9CF-40AE-B4C6-C98DA3205C09}" type="datetimeFigureOut">
               <a:rPr lang="en-US" smtClean="0"/>
               <a:pPr/>
-              <a:t>8/17/2011</a:t>
+              <a:t>10/17/2011</a:t>
             </a:fld>
             <a:endParaRPr lang="en-US"/>
           </a:p>
@@ -1047,7 +1048,7 @@
             <a:fld id="{1D8BD707-D9CF-40AE-B4C6-C98DA3205C09}" type="datetimeFigureOut">
               <a:rPr lang="en-US" smtClean="0"/>
               <a:pPr/>
-              <a:t>8/17/2011</a:t>
+              <a:t>10/17/2011</a:t>
             </a:fld>
             <a:endParaRPr lang="en-US"/>
           </a:p>
@@ -1332,7 +1333,7 @@
             <a:fld id="{1D8BD707-D9CF-40AE-B4C6-C98DA3205C09}" type="datetimeFigureOut">
               <a:rPr lang="en-US" smtClean="0"/>
               <a:pPr/>
-              <a:t>8/17/2011</a:t>
+              <a:t>10/17/2011</a:t>
             </a:fld>
             <a:endParaRPr lang="en-US"/>
           </a:p>
@@ -1751,7 +1752,7 @@
             <a:fld id="{1D8BD707-D9CF-40AE-B4C6-C98DA3205C09}" type="datetimeFigureOut">
               <a:rPr lang="en-US" smtClean="0"/>
               <a:pPr/>
-              <a:t>8/17/2011</a:t>
+              <a:t>10/17/2011</a:t>
             </a:fld>
             <a:endParaRPr lang="en-US"/>
           </a:p>
@@ -1866,7 +1867,7 @@
             <a:fld id="{1D8BD707-D9CF-40AE-B4C6-C98DA3205C09}" type="datetimeFigureOut">
               <a:rPr lang="en-US" smtClean="0"/>
               <a:pPr/>
-              <a:t>8/17/2011</a:t>
+              <a:t>10/17/2011</a:t>
             </a:fld>
             <a:endParaRPr lang="en-US"/>
           </a:p>
@@ -1958,7 +1959,7 @@
             <a:fld id="{1D8BD707-D9CF-40AE-B4C6-C98DA3205C09}" type="datetimeFigureOut">
               <a:rPr lang="en-US" smtClean="0"/>
               <a:pPr/>
-              <a:t>8/17/2011</a:t>
+              <a:t>10/17/2011</a:t>
             </a:fld>
             <a:endParaRPr lang="en-US"/>
           </a:p>
@@ -2232,7 +2233,7 @@
             <a:fld id="{1D8BD707-D9CF-40AE-B4C6-C98DA3205C09}" type="datetimeFigureOut">
               <a:rPr lang="en-US" smtClean="0"/>
               <a:pPr/>
-              <a:t>8/17/2011</a:t>
+              <a:t>10/17/2011</a:t>
             </a:fld>
             <a:endParaRPr lang="en-US"/>
           </a:p>
@@ -2482,7 +2483,7 @@
             <a:fld id="{1D8BD707-D9CF-40AE-B4C6-C98DA3205C09}" type="datetimeFigureOut">
               <a:rPr lang="en-US" smtClean="0"/>
               <a:pPr/>
-              <a:t>8/17/2011</a:t>
+              <a:t>10/17/2011</a:t>
             </a:fld>
             <a:endParaRPr lang="en-US"/>
           </a:p>
@@ -2692,7 +2693,7 @@
             <a:fld id="{1D8BD707-D9CF-40AE-B4C6-C98DA3205C09}" type="datetimeFigureOut">
               <a:rPr lang="en-US" smtClean="0"/>
               <a:pPr/>
-              <a:t>8/17/2011</a:t>
+              <a:t>10/17/2011</a:t>
             </a:fld>
             <a:endParaRPr lang="en-US"/>
           </a:p>
@@ -4752,6 +4753,304 @@
 </p:sld>
 </file>
 
+<file path=ppt/slides/slide6.xml><?xml version="1.0" encoding="utf-8"?>
+<p:sld xmlns:a="http://schemas.openxmlformats.org/drawingml/2006/main" xmlns:r="http://schemas.openxmlformats.org/officeDocument/2006/relationships" xmlns:p="http://schemas.openxmlformats.org/presentationml/2006/main">
+  <p:cSld>
+    <p:spTree>
+      <p:nvGrpSpPr>
+        <p:cNvPr id="1" name=""/>
+        <p:cNvGrpSpPr/>
+        <p:nvPr/>
+      </p:nvGrpSpPr>
+      <p:grpSpPr>
+        <a:xfrm>
+          <a:off x="0" y="0"/>
+          <a:ext cx="0" cy="0"/>
+          <a:chOff x="0" y="0"/>
+          <a:chExt cx="0" cy="0"/>
+        </a:xfrm>
+      </p:grpSpPr>
+      <p:sp>
+        <p:nvSpPr>
+          <p:cNvPr id="2" name="Rectangle 1"/>
+          <p:cNvSpPr/>
+          <p:nvPr/>
+        </p:nvSpPr>
+        <p:spPr>
+          <a:xfrm>
+            <a:off x="838200" y="914400"/>
+            <a:ext cx="914400" cy="914400"/>
+          </a:xfrm>
+          <a:prstGeom prst="rect">
+            <a:avLst/>
+          </a:prstGeom>
+        </p:spPr>
+        <p:style>
+          <a:lnRef idx="2">
+            <a:schemeClr val="accent1">
+              <a:shade val="50000"/>
+            </a:schemeClr>
+          </a:lnRef>
+          <a:fillRef idx="1">
+            <a:schemeClr val="accent1"/>
+          </a:fillRef>
+          <a:effectRef idx="0">
+            <a:schemeClr val="accent1"/>
+          </a:effectRef>
+          <a:fontRef idx="minor">
+            <a:schemeClr val="lt1"/>
+          </a:fontRef>
+        </p:style>
+        <p:txBody>
+          <a:bodyPr rtlCol="0" anchor="ctr"/>
+          <a:lstStyle/>
+          <a:p>
+            <a:pPr algn="ctr"/>
+            <a:endParaRPr lang="en-US"/>
+          </a:p>
+        </p:txBody>
+      </p:sp>
+      <p:sp>
+        <p:nvSpPr>
+          <p:cNvPr id="9" name="Rectangle 8"/>
+          <p:cNvSpPr/>
+          <p:nvPr/>
+        </p:nvSpPr>
+        <p:spPr>
+          <a:xfrm>
+            <a:off x="2209800" y="914400"/>
+            <a:ext cx="914400" cy="914400"/>
+          </a:xfrm>
+          <a:prstGeom prst="rect">
+            <a:avLst/>
+          </a:prstGeom>
+          <a:solidFill>
+            <a:schemeClr val="accent1">
+              <a:lumMod val="20000"/>
+              <a:lumOff val="80000"/>
+            </a:schemeClr>
+          </a:solidFill>
+        </p:spPr>
+        <p:style>
+          <a:lnRef idx="2">
+            <a:schemeClr val="accent1">
+              <a:shade val="50000"/>
+            </a:schemeClr>
+          </a:lnRef>
+          <a:fillRef idx="1">
+            <a:schemeClr val="accent1"/>
+          </a:fillRef>
+          <a:effectRef idx="0">
+            <a:schemeClr val="accent1"/>
+          </a:effectRef>
+          <a:fontRef idx="minor">
+            <a:schemeClr val="lt1"/>
+          </a:fontRef>
+        </p:style>
+        <p:txBody>
+          <a:bodyPr rtlCol="0" anchor="ctr"/>
+          <a:lstStyle/>
+          <a:p>
+            <a:pPr algn="ctr"/>
+            <a:endParaRPr lang="en-US"/>
+          </a:p>
+        </p:txBody>
+      </p:sp>
+      <p:sp>
+        <p:nvSpPr>
+          <p:cNvPr id="10" name="Rectangle 9"/>
+          <p:cNvSpPr/>
+          <p:nvPr/>
+        </p:nvSpPr>
+        <p:spPr>
+          <a:xfrm>
+            <a:off x="3429000" y="914400"/>
+            <a:ext cx="914400" cy="914400"/>
+          </a:xfrm>
+          <a:prstGeom prst="rect">
+            <a:avLst/>
+          </a:prstGeom>
+          <a:solidFill>
+            <a:schemeClr val="accent1">
+              <a:lumMod val="40000"/>
+              <a:lumOff val="60000"/>
+            </a:schemeClr>
+          </a:solidFill>
+        </p:spPr>
+        <p:style>
+          <a:lnRef idx="2">
+            <a:schemeClr val="accent1">
+              <a:shade val="50000"/>
+            </a:schemeClr>
+          </a:lnRef>
+          <a:fillRef idx="1">
+            <a:schemeClr val="accent1"/>
+          </a:fillRef>
+          <a:effectRef idx="0">
+            <a:schemeClr val="accent1"/>
+          </a:effectRef>
+          <a:fontRef idx="minor">
+            <a:schemeClr val="lt1"/>
+          </a:fontRef>
+        </p:style>
+        <p:txBody>
+          <a:bodyPr rtlCol="0" anchor="ctr"/>
+          <a:lstStyle/>
+          <a:p>
+            <a:pPr algn="ctr"/>
+            <a:endParaRPr lang="en-US"/>
+          </a:p>
+        </p:txBody>
+      </p:sp>
+      <p:sp>
+        <p:nvSpPr>
+          <p:cNvPr id="11" name="Rectangle 10"/>
+          <p:cNvSpPr/>
+          <p:nvPr/>
+        </p:nvSpPr>
+        <p:spPr>
+          <a:xfrm>
+            <a:off x="4648200" y="914400"/>
+            <a:ext cx="914400" cy="914400"/>
+          </a:xfrm>
+          <a:prstGeom prst="rect">
+            <a:avLst/>
+          </a:prstGeom>
+          <a:solidFill>
+            <a:schemeClr val="accent1">
+              <a:lumMod val="60000"/>
+              <a:lumOff val="40000"/>
+            </a:schemeClr>
+          </a:solidFill>
+        </p:spPr>
+        <p:style>
+          <a:lnRef idx="2">
+            <a:schemeClr val="accent1">
+              <a:shade val="50000"/>
+            </a:schemeClr>
+          </a:lnRef>
+          <a:fillRef idx="1">
+            <a:schemeClr val="accent1"/>
+          </a:fillRef>
+          <a:effectRef idx="0">
+            <a:schemeClr val="accent1"/>
+          </a:effectRef>
+          <a:fontRef idx="minor">
+            <a:schemeClr val="lt1"/>
+          </a:fontRef>
+        </p:style>
+        <p:txBody>
+          <a:bodyPr rtlCol="0" anchor="ctr"/>
+          <a:lstStyle/>
+          <a:p>
+            <a:pPr algn="ctr"/>
+            <a:endParaRPr lang="en-US"/>
+          </a:p>
+        </p:txBody>
+      </p:sp>
+      <p:sp>
+        <p:nvSpPr>
+          <p:cNvPr id="12" name="Rectangle 11"/>
+          <p:cNvSpPr/>
+          <p:nvPr/>
+        </p:nvSpPr>
+        <p:spPr>
+          <a:xfrm>
+            <a:off x="5943600" y="914400"/>
+            <a:ext cx="914400" cy="914400"/>
+          </a:xfrm>
+          <a:prstGeom prst="rect">
+            <a:avLst/>
+          </a:prstGeom>
+          <a:solidFill>
+            <a:schemeClr val="accent1">
+              <a:lumMod val="75000"/>
+            </a:schemeClr>
+          </a:solidFill>
+        </p:spPr>
+        <p:style>
+          <a:lnRef idx="2">
+            <a:schemeClr val="accent1">
+              <a:shade val="50000"/>
+            </a:schemeClr>
+          </a:lnRef>
+          <a:fillRef idx="1">
+            <a:schemeClr val="accent1"/>
+          </a:fillRef>
+          <a:effectRef idx="0">
+            <a:schemeClr val="accent1"/>
+          </a:effectRef>
+          <a:fontRef idx="minor">
+            <a:schemeClr val="lt1"/>
+          </a:fontRef>
+        </p:style>
+        <p:txBody>
+          <a:bodyPr rtlCol="0" anchor="ctr"/>
+          <a:lstStyle/>
+          <a:p>
+            <a:pPr algn="ctr"/>
+            <a:endParaRPr lang="en-US"/>
+          </a:p>
+        </p:txBody>
+      </p:sp>
+      <p:sp>
+        <p:nvSpPr>
+          <p:cNvPr id="13" name="Rectangle 12"/>
+          <p:cNvSpPr/>
+          <p:nvPr/>
+        </p:nvSpPr>
+        <p:spPr>
+          <a:xfrm>
+            <a:off x="7543800" y="914400"/>
+            <a:ext cx="914400" cy="914400"/>
+          </a:xfrm>
+          <a:prstGeom prst="rect">
+            <a:avLst/>
+          </a:prstGeom>
+          <a:solidFill>
+            <a:schemeClr val="accent1">
+              <a:lumMod val="50000"/>
+            </a:schemeClr>
+          </a:solidFill>
+        </p:spPr>
+        <p:style>
+          <a:lnRef idx="2">
+            <a:schemeClr val="accent1">
+              <a:shade val="50000"/>
+            </a:schemeClr>
+          </a:lnRef>
+          <a:fillRef idx="1">
+            <a:schemeClr val="accent1"/>
+          </a:fillRef>
+          <a:effectRef idx="0">
+            <a:schemeClr val="accent1"/>
+          </a:effectRef>
+          <a:fontRef idx="minor">
+            <a:schemeClr val="lt1"/>
+          </a:fontRef>
+        </p:style>
+        <p:txBody>
+          <a:bodyPr rtlCol="0" anchor="ctr"/>
+          <a:lstStyle/>
+          <a:p>
+            <a:pPr algn="ctr"/>
+            <a:endParaRPr lang="en-US"/>
+          </a:p>
+        </p:txBody>
+      </p:sp>
+    </p:spTree>
+    <p:extLst>
+      <p:ext uri="{BB962C8B-B14F-4D97-AF65-F5344CB8AC3E}">
+        <p14:creationId xmlns:p14="http://schemas.microsoft.com/office/powerpoint/2010/main" val="2509082867"/>
+      </p:ext>
+    </p:extLst>
+  </p:cSld>
+  <p:clrMapOvr>
+    <a:masterClrMapping/>
+  </p:clrMapOvr>
+</p:sld>
+</file>
+
 <file path=ppt/theme/theme1.xml><?xml version="1.0" encoding="utf-8"?>
 <a:theme xmlns:a="http://schemas.openxmlformats.org/drawingml/2006/main" name="Office Theme">
   <a:themeElements>

</xml_diff>